<commit_message>
Added the .NET overview lecture (95% done)
</commit_message>
<xml_diff>
--- a/lectures/1. .NET Framework Overview.pptx
+++ b/lectures/1. .NET Framework Overview.pptx
@@ -312,7 +312,7 @@
             <a:fld id="{3BF7C7B5-275F-4D1F-9AB4-9255447DBC73}" type="datetimeFigureOut">
               <a:rPr lang="en-US"/>
               <a:pPr/>
-              <a:t>2/11/2010</a:t>
+              <a:t>2/15/2010</a:t>
             </a:fld>
             <a:endParaRPr lang="en-US" dirty="0"/>
           </a:p>
@@ -538,7 +538,7 @@
             <a:fld id="{9B46F231-FB2B-4655-A644-E2477325E686}" type="datetimeFigureOut">
               <a:rPr lang="en-US"/>
               <a:pPr/>
-              <a:t>2/11/2010</a:t>
+              <a:t>2/15/2010</a:t>
             </a:fld>
             <a:endParaRPr lang="en-US" dirty="0"/>
           </a:p>
@@ -12325,15 +12325,7 @@
             <a:pPr marL="622300" lvl="1" indent="-260350"/>
             <a:r>
               <a:rPr lang="en-US" dirty="0" smtClean="0"/>
-              <a:t>Input-output</a:t>
-            </a:r>
-            <a:r>
-              <a:rPr lang="en-US" dirty="0" smtClean="0"/>
-              <a:t>, </a:t>
-            </a:r>
-            <a:r>
-              <a:rPr lang="en-US" dirty="0" smtClean="0"/>
-              <a:t>collections</a:t>
+              <a:t>Input-output, collections</a:t>
             </a:r>
             <a:r>
               <a:rPr lang="en-US" dirty="0"/>
@@ -13061,43 +13053,7 @@
                   </a:outerShdw>
                 </a:effectLst>
               </a:rPr>
-              <a:t>XML (</a:t>
-            </a:r>
-            <a:r>
-              <a:rPr lang="en-US" sz="2400" b="1" dirty="0" smtClean="0">
-                <a:solidFill>
-                  <a:schemeClr val="tx1">
-                    <a:lumMod val="60000"/>
-                    <a:lumOff val="40000"/>
-                  </a:schemeClr>
-                </a:solidFill>
-                <a:effectLst>
-                  <a:outerShdw blurRad="38100" dist="38100" dir="2700000" algn="tl">
-                    <a:srgbClr val="000000">
-                      <a:alpha val="43137"/>
-                    </a:srgbClr>
-                  </a:outerShdw>
-                </a:effectLst>
-              </a:rPr>
-              <a:t>Data Tier</a:t>
-            </a:r>
-            <a:r>
-              <a:rPr lang="en-US" sz="2400" b="1" dirty="0" smtClean="0">
-                <a:solidFill>
-                  <a:schemeClr val="tx1">
-                    <a:lumMod val="60000"/>
-                    <a:lumOff val="40000"/>
-                  </a:schemeClr>
-                </a:solidFill>
-                <a:effectLst>
-                  <a:outerShdw blurRad="38100" dist="38100" dir="2700000" algn="tl">
-                    <a:srgbClr val="000000">
-                      <a:alpha val="43137"/>
-                    </a:srgbClr>
-                  </a:outerShdw>
-                </a:effectLst>
-              </a:rPr>
-              <a:t>)</a:t>
+              <a:t>XML (Data Tier)</a:t>
             </a:r>
             <a:endParaRPr lang="en-US" sz="2400" b="1" dirty="0">
               <a:solidFill>
@@ -13315,6 +13271,44 @@
           </a:p>
         </p:txBody>
       </p:sp>
+      <p:pic>
+        <p:nvPicPr>
+          <p:cNvPr id="88066" name="Picture 2" descr="http://www.checkitout.co.uk/images/database_design.jpg"/>
+          <p:cNvPicPr>
+            <a:picLocks noChangeAspect="1" noChangeArrowheads="1"/>
+          </p:cNvPicPr>
+          <p:nvPr/>
+        </p:nvPicPr>
+        <p:blipFill>
+          <a:blip r:embed="rId3" cstate="print"/>
+          <a:srcRect/>
+          <a:stretch>
+            <a:fillRect/>
+          </a:stretch>
+        </p:blipFill>
+        <p:spPr bwMode="auto">
+          <a:xfrm>
+            <a:off x="6096000" y="2514600"/>
+            <a:ext cx="2444750" cy="1133475"/>
+          </a:xfrm>
+          <a:prstGeom prst="roundRect">
+            <a:avLst>
+              <a:gd name="adj" fmla="val 8594"/>
+            </a:avLst>
+          </a:prstGeom>
+          <a:solidFill>
+            <a:srgbClr val="FFFFFF">
+              <a:shade val="85000"/>
+            </a:srgbClr>
+          </a:solidFill>
+          <a:ln>
+            <a:noFill/>
+          </a:ln>
+          <a:effectLst>
+            <a:reflection blurRad="12700" stA="38000" endPos="28000" dist="5000" dir="5400000" sy="-100000" algn="bl" rotWithShape="0"/>
+          </a:effectLst>
+        </p:spPr>
+      </p:pic>
     </p:spTree>
   </p:cSld>
   <p:clrMapOvr>
@@ -14003,43 +13997,7 @@
                   </a:outerShdw>
                 </a:effectLst>
               </a:rPr>
-              <a:t>XML (</a:t>
-            </a:r>
-            <a:r>
-              <a:rPr lang="en-US" sz="2400" b="1" dirty="0" smtClean="0">
-                <a:solidFill>
-                  <a:schemeClr val="tx1">
-                    <a:lumMod val="60000"/>
-                    <a:lumOff val="40000"/>
-                  </a:schemeClr>
-                </a:solidFill>
-                <a:effectLst>
-                  <a:outerShdw blurRad="38100" dist="38100" dir="2700000" algn="tl">
-                    <a:srgbClr val="000000">
-                      <a:alpha val="43137"/>
-                    </a:srgbClr>
-                  </a:outerShdw>
-                </a:effectLst>
-              </a:rPr>
-              <a:t>Data Tier</a:t>
-            </a:r>
-            <a:r>
-              <a:rPr lang="en-US" sz="2400" b="1" dirty="0" smtClean="0">
-                <a:solidFill>
-                  <a:schemeClr val="tx1">
-                    <a:lumMod val="60000"/>
-                    <a:lumOff val="40000"/>
-                  </a:schemeClr>
-                </a:solidFill>
-                <a:effectLst>
-                  <a:outerShdw blurRad="38100" dist="38100" dir="2700000" algn="tl">
-                    <a:srgbClr val="000000">
-                      <a:alpha val="43137"/>
-                    </a:srgbClr>
-                  </a:outerShdw>
-                </a:effectLst>
-              </a:rPr>
-              <a:t>)</a:t>
+              <a:t>XML (Data Tier)</a:t>
             </a:r>
             <a:endParaRPr lang="en-US" sz="2400" b="1" dirty="0">
               <a:solidFill>
@@ -14157,43 +14115,7 @@
                   </a:outerShdw>
                 </a:effectLst>
               </a:rPr>
-              <a:t>WCF and WWF (Communication and Workflow </a:t>
-            </a:r>
-            <a:r>
-              <a:rPr lang="en-US" sz="2400" b="1" dirty="0" smtClean="0">
-                <a:solidFill>
-                  <a:schemeClr val="tx1">
-                    <a:lumMod val="60000"/>
-                    <a:lumOff val="40000"/>
-                  </a:schemeClr>
-                </a:solidFill>
-                <a:effectLst>
-                  <a:outerShdw blurRad="38100" dist="38100" dir="2700000" algn="tl">
-                    <a:srgbClr val="000000">
-                      <a:alpha val="43137"/>
-                    </a:srgbClr>
-                  </a:outerShdw>
-                </a:effectLst>
-              </a:rPr>
-              <a:t>Tier</a:t>
-            </a:r>
-            <a:r>
-              <a:rPr lang="en-US" sz="2400" b="1" dirty="0" smtClean="0">
-                <a:solidFill>
-                  <a:schemeClr val="tx1">
-                    <a:lumMod val="60000"/>
-                    <a:lumOff val="40000"/>
-                  </a:schemeClr>
-                </a:solidFill>
-                <a:effectLst>
-                  <a:outerShdw blurRad="38100" dist="38100" dir="2700000" algn="tl">
-                    <a:srgbClr val="000000">
-                      <a:alpha val="43137"/>
-                    </a:srgbClr>
-                  </a:outerShdw>
-                </a:effectLst>
-              </a:rPr>
-              <a:t>)</a:t>
+              <a:t>WCF and WWF (Communication and Workflow Tier)</a:t>
             </a:r>
             <a:endParaRPr lang="en-US" sz="2400" b="1" dirty="0">
               <a:solidFill>
@@ -14272,6 +14194,44 @@
           </a:p>
         </p:txBody>
       </p:sp>
+      <p:pic>
+        <p:nvPicPr>
+          <p:cNvPr id="86018" name="Picture 2" descr="http://www.thedotnetway.net/wp-content/uploads/2009/09/WCF.jpg"/>
+          <p:cNvPicPr>
+            <a:picLocks noChangeAspect="1" noChangeArrowheads="1"/>
+          </p:cNvPicPr>
+          <p:nvPr/>
+        </p:nvPicPr>
+        <p:blipFill>
+          <a:blip r:embed="rId3" cstate="print"/>
+          <a:srcRect/>
+          <a:stretch>
+            <a:fillRect/>
+          </a:stretch>
+        </p:blipFill>
+        <p:spPr bwMode="auto">
+          <a:xfrm>
+            <a:off x="7018742" y="1066800"/>
+            <a:ext cx="1744258" cy="1066800"/>
+          </a:xfrm>
+          <a:prstGeom prst="roundRect">
+            <a:avLst>
+              <a:gd name="adj" fmla="val 8594"/>
+            </a:avLst>
+          </a:prstGeom>
+          <a:solidFill>
+            <a:srgbClr val="FFFFFF">
+              <a:shade val="85000"/>
+            </a:srgbClr>
+          </a:solidFill>
+          <a:ln>
+            <a:noFill/>
+          </a:ln>
+          <a:effectLst>
+            <a:reflection blurRad="12700" stA="38000" endPos="28000" dist="5000" dir="5400000" sy="-100000" algn="bl" rotWithShape="0"/>
+          </a:effectLst>
+        </p:spPr>
+      </p:pic>
     </p:spTree>
   </p:cSld>
   <p:clrMapOvr>
@@ -14791,43 +14751,7 @@
                   </a:outerShdw>
                 </a:effectLst>
               </a:rPr>
-              <a:t>XML (</a:t>
-            </a:r>
-            <a:r>
-              <a:rPr lang="en-US" sz="2400" b="1" dirty="0" smtClean="0">
-                <a:solidFill>
-                  <a:schemeClr val="tx1">
-                    <a:lumMod val="60000"/>
-                    <a:lumOff val="40000"/>
-                  </a:schemeClr>
-                </a:solidFill>
-                <a:effectLst>
-                  <a:outerShdw blurRad="38100" dist="38100" dir="2700000" algn="tl">
-                    <a:srgbClr val="000000">
-                      <a:alpha val="43137"/>
-                    </a:srgbClr>
-                  </a:outerShdw>
-                </a:effectLst>
-              </a:rPr>
-              <a:t>Data Tier</a:t>
-            </a:r>
-            <a:r>
-              <a:rPr lang="en-US" sz="2400" b="1" dirty="0" smtClean="0">
-                <a:solidFill>
-                  <a:schemeClr val="tx1">
-                    <a:lumMod val="60000"/>
-                    <a:lumOff val="40000"/>
-                  </a:schemeClr>
-                </a:solidFill>
-                <a:effectLst>
-                  <a:outerShdw blurRad="38100" dist="38100" dir="2700000" algn="tl">
-                    <a:srgbClr val="000000">
-                      <a:alpha val="43137"/>
-                    </a:srgbClr>
-                  </a:outerShdw>
-                </a:effectLst>
-              </a:rPr>
-              <a:t>)</a:t>
+              <a:t>XML (Data Tier)</a:t>
             </a:r>
             <a:endParaRPr lang="en-US" sz="2400" b="1" dirty="0">
               <a:solidFill>
@@ -14945,43 +14869,7 @@
                   </a:outerShdw>
                 </a:effectLst>
               </a:rPr>
-              <a:t>WCF and WWF (Communication and Workflow </a:t>
-            </a:r>
-            <a:r>
-              <a:rPr lang="en-US" sz="2400" b="1" dirty="0" smtClean="0">
-                <a:solidFill>
-                  <a:schemeClr val="tx1">
-                    <a:lumMod val="60000"/>
-                    <a:lumOff val="40000"/>
-                  </a:schemeClr>
-                </a:solidFill>
-                <a:effectLst>
-                  <a:outerShdw blurRad="38100" dist="38100" dir="2700000" algn="tl">
-                    <a:srgbClr val="000000">
-                      <a:alpha val="43137"/>
-                    </a:srgbClr>
-                  </a:outerShdw>
-                </a:effectLst>
-              </a:rPr>
-              <a:t>Tier</a:t>
-            </a:r>
-            <a:r>
-              <a:rPr lang="en-US" sz="2400" b="1" dirty="0" smtClean="0">
-                <a:solidFill>
-                  <a:schemeClr val="tx1">
-                    <a:lumMod val="60000"/>
-                    <a:lumOff val="40000"/>
-                  </a:schemeClr>
-                </a:solidFill>
-                <a:effectLst>
-                  <a:outerShdw blurRad="38100" dist="38100" dir="2700000" algn="tl">
-                    <a:srgbClr val="000000">
-                      <a:alpha val="43137"/>
-                    </a:srgbClr>
-                  </a:outerShdw>
-                </a:effectLst>
-              </a:rPr>
-              <a:t>)</a:t>
+              <a:t>WCF and WWF (Communication and Workflow Tier)</a:t>
             </a:r>
             <a:endParaRPr lang="en-US" sz="2400" b="1" dirty="0">
               <a:solidFill>
@@ -15461,45 +15349,7 @@
                 </a:effectLst>
                 <a:latin typeface="+mn-lt"/>
               </a:rPr>
-              <a:t>User interface technologies: Web based, Windows GUI, WPF, Silverlight, </a:t>
-            </a:r>
-            <a:r>
-              <a:rPr lang="en-US" sz="3000" b="1" dirty="0" smtClean="0">
-                <a:solidFill>
-                  <a:schemeClr val="tx1">
-                    <a:lumMod val="40000"/>
-                    <a:lumOff val="60000"/>
-                  </a:schemeClr>
-                </a:solidFill>
-                <a:effectLst>
-                  <a:outerShdw blurRad="38100" dist="38100" dir="2700000" algn="tl">
-                    <a:srgbClr val="000000">
-                      <a:alpha val="43137"/>
-                    </a:srgbClr>
-                  </a:outerShdw>
-                </a:effectLst>
-                <a:latin typeface="+mn-lt"/>
-              </a:rPr>
-              <a:t>mobile, </a:t>
-            </a:r>
-            <a:r>
-              <a:rPr lang="en-US" sz="3000" b="1" dirty="0" smtClean="0">
-                <a:solidFill>
-                  <a:schemeClr val="tx1">
-                    <a:lumMod val="40000"/>
-                    <a:lumOff val="60000"/>
-                  </a:schemeClr>
-                </a:solidFill>
-                <a:effectLst>
-                  <a:outerShdw blurRad="38100" dist="38100" dir="2700000" algn="tl">
-                    <a:srgbClr val="000000">
-                      <a:alpha val="43137"/>
-                    </a:srgbClr>
-                  </a:outerShdw>
-                </a:effectLst>
-                <a:latin typeface="+mn-lt"/>
-              </a:rPr>
-              <a:t>…</a:t>
+              <a:t>User interface technologies: Web based, Windows GUI, WPF, Silverlight, mobile, …</a:t>
             </a:r>
           </a:p>
         </p:txBody>
@@ -16328,43 +16178,7 @@
                   </a:outerShdw>
                 </a:effectLst>
               </a:rPr>
-              <a:t>XML (</a:t>
-            </a:r>
-            <a:r>
-              <a:rPr lang="en-US" sz="2400" b="1" dirty="0" smtClean="0">
-                <a:solidFill>
-                  <a:schemeClr val="tx1">
-                    <a:lumMod val="60000"/>
-                    <a:lumOff val="40000"/>
-                  </a:schemeClr>
-                </a:solidFill>
-                <a:effectLst>
-                  <a:outerShdw blurRad="38100" dist="38100" dir="2700000" algn="tl">
-                    <a:srgbClr val="000000">
-                      <a:alpha val="43137"/>
-                    </a:srgbClr>
-                  </a:outerShdw>
-                </a:effectLst>
-              </a:rPr>
-              <a:t>Data Tier</a:t>
-            </a:r>
-            <a:r>
-              <a:rPr lang="en-US" sz="2400" b="1" dirty="0" smtClean="0">
-                <a:solidFill>
-                  <a:schemeClr val="tx1">
-                    <a:lumMod val="60000"/>
-                    <a:lumOff val="40000"/>
-                  </a:schemeClr>
-                </a:solidFill>
-                <a:effectLst>
-                  <a:outerShdw blurRad="38100" dist="38100" dir="2700000" algn="tl">
-                    <a:srgbClr val="000000">
-                      <a:alpha val="43137"/>
-                    </a:srgbClr>
-                  </a:outerShdw>
-                </a:effectLst>
-              </a:rPr>
-              <a:t>)</a:t>
+              <a:t>XML (Data Tier)</a:t>
             </a:r>
             <a:endParaRPr lang="en-US" sz="2400" b="1" dirty="0">
               <a:solidFill>
@@ -16482,43 +16296,7 @@
                   </a:outerShdw>
                 </a:effectLst>
               </a:rPr>
-              <a:t>WCF and WWF (Communication and Workflow </a:t>
-            </a:r>
-            <a:r>
-              <a:rPr lang="en-US" sz="2400" b="1" dirty="0" smtClean="0">
-                <a:solidFill>
-                  <a:schemeClr val="tx1">
-                    <a:lumMod val="60000"/>
-                    <a:lumOff val="40000"/>
-                  </a:schemeClr>
-                </a:solidFill>
-                <a:effectLst>
-                  <a:outerShdw blurRad="38100" dist="38100" dir="2700000" algn="tl">
-                    <a:srgbClr val="000000">
-                      <a:alpha val="43137"/>
-                    </a:srgbClr>
-                  </a:outerShdw>
-                </a:effectLst>
-              </a:rPr>
-              <a:t>Tier</a:t>
-            </a:r>
-            <a:r>
-              <a:rPr lang="en-US" sz="2400" b="1" dirty="0" smtClean="0">
-                <a:solidFill>
-                  <a:schemeClr val="tx1">
-                    <a:lumMod val="60000"/>
-                    <a:lumOff val="40000"/>
-                  </a:schemeClr>
-                </a:solidFill>
-                <a:effectLst>
-                  <a:outerShdw blurRad="38100" dist="38100" dir="2700000" algn="tl">
-                    <a:srgbClr val="000000">
-                      <a:alpha val="43137"/>
-                    </a:srgbClr>
-                  </a:outerShdw>
-                </a:effectLst>
-              </a:rPr>
-              <a:t>)</a:t>
+              <a:t>WCF and WWF (Communication and Workflow Tier)</a:t>
             </a:r>
             <a:endParaRPr lang="en-US" sz="2400" b="1" dirty="0">
               <a:solidFill>
@@ -18486,7 +18264,7 @@
         </p:nvPicPr>
         <p:blipFill>
           <a:blip r:embed="rId2" cstate="print"/>
-          <a:srcRect/>
+          <a:srcRect r="687" b="1057"/>
           <a:stretch>
             <a:fillRect/>
           </a:stretch>
@@ -18494,12 +18272,22 @@
         <p:spPr bwMode="auto">
           <a:xfrm>
             <a:off x="1008460" y="1170264"/>
-            <a:ext cx="7068740" cy="5306736"/>
+            <a:ext cx="7020173" cy="5250633"/>
           </a:xfrm>
-          <a:prstGeom prst="rect">
-            <a:avLst/>
+          <a:prstGeom prst="roundRect">
+            <a:avLst>
+              <a:gd name="adj" fmla="val 2697"/>
+            </a:avLst>
           </a:prstGeom>
           <a:noFill/>
+          <a:ln w="3175">
+            <a:solidFill>
+              <a:schemeClr val="accent5">
+                <a:lumMod val="20000"/>
+                <a:lumOff val="80000"/>
+              </a:schemeClr>
+            </a:solidFill>
+          </a:ln>
         </p:spPr>
       </p:pic>
     </p:spTree>
@@ -18527,6 +18315,44 @@
           <a:chExt cx="0" cy="0"/>
         </a:xfrm>
       </p:grpSpPr>
+      <p:pic>
+        <p:nvPicPr>
+          <p:cNvPr id="78850" name="Picture 2" descr="http://blog.radvision.com/images/2009/20090402-VoipSurvivor-virtual-machine.jpg"/>
+          <p:cNvPicPr>
+            <a:picLocks noChangeAspect="1" noChangeArrowheads="1"/>
+          </p:cNvPicPr>
+          <p:nvPr/>
+        </p:nvPicPr>
+        <p:blipFill>
+          <a:blip r:embed="rId3" cstate="print"/>
+          <a:srcRect/>
+          <a:stretch>
+            <a:fillRect/>
+          </a:stretch>
+        </p:blipFill>
+        <p:spPr bwMode="auto">
+          <a:xfrm>
+            <a:off x="1828800" y="1066800"/>
+            <a:ext cx="5257800" cy="2552700"/>
+          </a:xfrm>
+          <a:prstGeom prst="roundRect">
+            <a:avLst>
+              <a:gd name="adj" fmla="val 8594"/>
+            </a:avLst>
+          </a:prstGeom>
+          <a:solidFill>
+            <a:srgbClr val="FFFFFF">
+              <a:shade val="85000"/>
+            </a:srgbClr>
+          </a:solidFill>
+          <a:ln>
+            <a:noFill/>
+          </a:ln>
+          <a:effectLst>
+            <a:reflection blurRad="12700" stA="38000" endPos="28000" dist="5000" dir="5400000" sy="-100000" algn="bl" rotWithShape="0"/>
+          </a:effectLst>
+        </p:spPr>
+      </p:pic>
       <p:sp>
         <p:nvSpPr>
           <p:cNvPr id="1564674" name="Rectangle 2"/>
@@ -18539,7 +18365,7 @@
         </p:nvSpPr>
         <p:spPr>
           <a:xfrm>
-            <a:off x="1216025" y="2316163"/>
+            <a:off x="1216025" y="3916363"/>
             <a:ext cx="6480175" cy="1473200"/>
           </a:xfrm>
         </p:spPr>
@@ -18583,7 +18409,7 @@
         </p:nvSpPr>
         <p:spPr>
           <a:xfrm>
-            <a:off x="1704975" y="4074320"/>
+            <a:off x="1704975" y="5638800"/>
             <a:ext cx="5486400" cy="497680"/>
           </a:xfrm>
         </p:spPr>
@@ -18858,6 +18684,34 @@
           </a:p>
         </p:txBody>
       </p:sp>
+      <p:pic>
+        <p:nvPicPr>
+          <p:cNvPr id="76802" name="Picture 2" descr="http://res.sys-con.com/story/feb09/843532/Virtual%20Machine%20226.jpg"/>
+          <p:cNvPicPr>
+            <a:picLocks noChangeAspect="1" noChangeArrowheads="1"/>
+          </p:cNvPicPr>
+          <p:nvPr/>
+        </p:nvPicPr>
+        <p:blipFill>
+          <a:blip r:embed="rId3" cstate="print"/>
+          <a:srcRect l="17699" r="15044"/>
+          <a:stretch>
+            <a:fillRect/>
+          </a:stretch>
+        </p:blipFill>
+        <p:spPr bwMode="auto">
+          <a:xfrm>
+            <a:off x="7010400" y="2514600"/>
+            <a:ext cx="1641600" cy="1371600"/>
+          </a:xfrm>
+          <a:prstGeom prst="roundRect">
+            <a:avLst>
+              <a:gd name="adj" fmla="val 8360"/>
+            </a:avLst>
+          </a:prstGeom>
+          <a:noFill/>
+        </p:spPr>
+      </p:pic>
     </p:spTree>
   </p:cSld>
   <p:clrMapOvr>
@@ -19060,6 +18914,40 @@
           </a:p>
         </p:txBody>
       </p:sp>
+      <p:pic>
+        <p:nvPicPr>
+          <p:cNvPr id="74756" name="Picture 4" descr="http://www.bjr-labs.com/images/functionality.jpg"/>
+          <p:cNvPicPr>
+            <a:picLocks noChangeAspect="1" noChangeArrowheads="1"/>
+          </p:cNvPicPr>
+          <p:nvPr/>
+        </p:nvPicPr>
+        <p:blipFill>
+          <a:blip r:embed="rId3" cstate="print"/>
+          <a:srcRect/>
+          <a:stretch>
+            <a:fillRect/>
+          </a:stretch>
+        </p:blipFill>
+        <p:spPr bwMode="auto">
+          <a:xfrm>
+            <a:off x="5943600" y="4419600"/>
+            <a:ext cx="2638425" cy="1962150"/>
+          </a:xfrm>
+          <a:prstGeom prst="rect">
+            <a:avLst/>
+          </a:prstGeom>
+          <a:noFill/>
+          <a:ln w="3175">
+            <a:solidFill>
+              <a:schemeClr val="accent5">
+                <a:lumMod val="40000"/>
+                <a:lumOff val="60000"/>
+              </a:schemeClr>
+            </a:solidFill>
+          </a:ln>
+        </p:spPr>
+      </p:pic>
     </p:spTree>
   </p:cSld>
   <p:clrMapOvr>
@@ -19175,15 +19063,7 @@
             </a:pPr>
             <a:r>
               <a:rPr lang="en-US" dirty="0" smtClean="0"/>
-              <a:t>Managing </a:t>
-            </a:r>
-            <a:r>
-              <a:rPr lang="en-US" dirty="0" smtClean="0"/>
-              <a:t>application </a:t>
-            </a:r>
-            <a:r>
-              <a:rPr lang="en-US" dirty="0" smtClean="0"/>
-              <a:t>domains and their isolation</a:t>
+              <a:t>Managing application domains and their isolation</a:t>
             </a:r>
             <a:endParaRPr lang="bg-BG" dirty="0" smtClean="0"/>
           </a:p>
@@ -19215,7 +19095,15 @@
             </a:r>
             <a:r>
               <a:rPr lang="en-US" dirty="0" smtClean="0"/>
-              <a:t>debug / profile of .NET code</a:t>
+              <a:t>debug </a:t>
+            </a:r>
+            <a:r>
+              <a:rPr lang="en-US" dirty="0" smtClean="0"/>
+              <a:t>/					 </a:t>
+            </a:r>
+            <a:r>
+              <a:rPr lang="en-US" dirty="0" smtClean="0"/>
+              <a:t>profile of .NET code</a:t>
             </a:r>
             <a:endParaRPr lang="bg-BG" dirty="0"/>
           </a:p>
@@ -19267,6 +19155,34 @@
           </a:p>
         </p:txBody>
       </p:sp>
+      <p:pic>
+        <p:nvPicPr>
+          <p:cNvPr id="72706" name="Picture 2" descr="http://www.realfreewebsites.com/blog/img/gears.jpg"/>
+          <p:cNvPicPr>
+            <a:picLocks noChangeAspect="1" noChangeArrowheads="1"/>
+          </p:cNvPicPr>
+          <p:nvPr/>
+        </p:nvPicPr>
+        <p:blipFill>
+          <a:blip r:embed="rId2" cstate="print"/>
+          <a:srcRect/>
+          <a:stretch>
+            <a:fillRect/>
+          </a:stretch>
+        </p:blipFill>
+        <p:spPr bwMode="auto">
+          <a:xfrm>
+            <a:off x="6043096" y="5029200"/>
+            <a:ext cx="2643704" cy="1383538"/>
+          </a:xfrm>
+          <a:prstGeom prst="roundRect">
+            <a:avLst>
+              <a:gd name="adj" fmla="val 8678"/>
+            </a:avLst>
+          </a:prstGeom>
+          <a:noFill/>
+        </p:spPr>
+      </p:pic>
     </p:spTree>
   </p:cSld>
   <p:clrMapOvr>
@@ -19502,6 +19418,72 @@
           </a:p>
         </p:txBody>
       </p:sp>
+      <p:pic>
+        <p:nvPicPr>
+          <p:cNvPr id="1026" name="Picture 2" descr="C:\Trash\dotnet-logo.png"/>
+          <p:cNvPicPr>
+            <a:picLocks noChangeAspect="1" noChangeArrowheads="1"/>
+          </p:cNvPicPr>
+          <p:nvPr/>
+        </p:nvPicPr>
+        <p:blipFill>
+          <a:blip r:embed="rId3" cstate="print"/>
+          <a:srcRect/>
+          <a:stretch>
+            <a:fillRect/>
+          </a:stretch>
+        </p:blipFill>
+        <p:spPr bwMode="auto">
+          <a:xfrm>
+            <a:off x="6762750" y="4572000"/>
+            <a:ext cx="1847850" cy="1828800"/>
+          </a:xfrm>
+          <a:prstGeom prst="roundRect">
+            <a:avLst>
+              <a:gd name="adj" fmla="val 7876"/>
+            </a:avLst>
+          </a:prstGeom>
+          <a:noFill/>
+        </p:spPr>
+      </p:pic>
+      <p:pic>
+        <p:nvPicPr>
+          <p:cNvPr id="1027" name="Picture 3" descr="C:\Trash\books3.jpg"/>
+          <p:cNvPicPr>
+            <a:picLocks noChangeAspect="1" noChangeArrowheads="1"/>
+          </p:cNvPicPr>
+          <p:nvPr/>
+        </p:nvPicPr>
+        <p:blipFill>
+          <a:blip r:embed="rId4" cstate="print"/>
+          <a:srcRect/>
+          <a:stretch>
+            <a:fillRect/>
+          </a:stretch>
+        </p:blipFill>
+        <p:spPr bwMode="auto">
+          <a:xfrm>
+            <a:off x="7504992" y="1219200"/>
+            <a:ext cx="1303048" cy="1752600"/>
+          </a:xfrm>
+          <a:prstGeom prst="roundRect">
+            <a:avLst>
+              <a:gd name="adj" fmla="val 8594"/>
+            </a:avLst>
+          </a:prstGeom>
+          <a:solidFill>
+            <a:srgbClr val="FFFFFF">
+              <a:shade val="85000"/>
+            </a:srgbClr>
+          </a:solidFill>
+          <a:ln>
+            <a:noFill/>
+          </a:ln>
+          <a:effectLst>
+            <a:reflection blurRad="12700" stA="38000" endPos="28000" dist="5000" dir="5400000" sy="-100000" algn="bl" rotWithShape="0"/>
+          </a:effectLst>
+        </p:spPr>
+      </p:pic>
     </p:spTree>
   </p:cSld>
   <p:clrMapOvr>
@@ -20429,7 +20411,7 @@
         </p:nvSpPr>
         <p:spPr>
           <a:xfrm>
-            <a:off x="1187450" y="2133600"/>
+            <a:off x="1187450" y="1043046"/>
             <a:ext cx="6480175" cy="1473200"/>
           </a:xfrm>
         </p:spPr>
@@ -20462,7 +20444,7 @@
         </p:nvSpPr>
         <p:spPr>
           <a:xfrm>
-            <a:off x="1684879" y="3891757"/>
+            <a:off x="1684879" y="2801203"/>
             <a:ext cx="5486400" cy="497680"/>
           </a:xfrm>
         </p:spPr>
@@ -20478,6 +20460,34 @@
           </a:p>
         </p:txBody>
       </p:sp>
+      <p:pic>
+        <p:nvPicPr>
+          <p:cNvPr id="69634" name="Picture 2" descr="msil.jpg"/>
+          <p:cNvPicPr>
+            <a:picLocks noChangeAspect="1" noChangeArrowheads="1"/>
+          </p:cNvPicPr>
+          <p:nvPr/>
+        </p:nvPicPr>
+        <p:blipFill>
+          <a:blip r:embed="rId3" cstate="print"/>
+          <a:srcRect/>
+          <a:stretch>
+            <a:fillRect/>
+          </a:stretch>
+        </p:blipFill>
+        <p:spPr bwMode="auto">
+          <a:xfrm flipH="1">
+            <a:off x="2362200" y="3557646"/>
+            <a:ext cx="4377266" cy="2690754"/>
+          </a:xfrm>
+          <a:prstGeom prst="roundRect">
+            <a:avLst>
+              <a:gd name="adj" fmla="val 5509"/>
+            </a:avLst>
+          </a:prstGeom>
+          <a:noFill/>
+        </p:spPr>
+      </p:pic>
     </p:spTree>
   </p:cSld>
   <p:clrMapOvr>
@@ -20869,11 +20879,7 @@
             </a:r>
             <a:r>
               <a:rPr lang="en-US" dirty="0" smtClean="0"/>
-              <a:t>type-safe</a:t>
-            </a:r>
-            <a:r>
-              <a:rPr lang="en-US" dirty="0" smtClean="0"/>
-              <a:t>)</a:t>
+              <a:t>type-safe)</a:t>
             </a:r>
             <a:endParaRPr lang="en-US" dirty="0"/>
           </a:p>
@@ -21420,7 +21426,7 @@
         </p:nvSpPr>
         <p:spPr>
           <a:xfrm>
-            <a:off x="1216025" y="2387600"/>
+            <a:off x="1216025" y="1193800"/>
             <a:ext cx="6480175" cy="1473200"/>
           </a:xfrm>
         </p:spPr>
@@ -21437,10 +21443,41 @@
               <a:rPr lang="en-US"/>
               <a:t>Intermediate Language (MSIL)</a:t>
             </a:r>
-            <a:endParaRPr lang="bg-BG"/>
-          </a:p>
-        </p:txBody>
-      </p:sp>
+            <a:endParaRPr lang="bg-BG" dirty="0"/>
+          </a:p>
+        </p:txBody>
+      </p:sp>
+      <p:pic>
+        <p:nvPicPr>
+          <p:cNvPr id="60418" name="Picture 2" descr="http://zamov.online.fr/images/assembler.jpg"/>
+          <p:cNvPicPr>
+            <a:picLocks noChangeAspect="1" noChangeArrowheads="1"/>
+          </p:cNvPicPr>
+          <p:nvPr/>
+        </p:nvPicPr>
+        <p:blipFill>
+          <a:blip r:embed="rId3" cstate="print"/>
+          <a:srcRect/>
+          <a:stretch>
+            <a:fillRect/>
+          </a:stretch>
+        </p:blipFill>
+        <p:spPr bwMode="auto">
+          <a:xfrm>
+            <a:off x="2218018" y="3124200"/>
+            <a:ext cx="4441264" cy="3124200"/>
+          </a:xfrm>
+          <a:prstGeom prst="rect">
+            <a:avLst/>
+          </a:prstGeom>
+          <a:ln>
+            <a:noFill/>
+          </a:ln>
+          <a:effectLst>
+            <a:softEdge rad="112500"/>
+          </a:effectLst>
+        </p:spPr>
+      </p:pic>
     </p:spTree>
   </p:cSld>
   <p:clrMapOvr>
@@ -21972,24 +22009,7 @@
                 <a:latin typeface="Consolas" pitchFamily="49" charset="0"/>
                 <a:cs typeface="Consolas" pitchFamily="49" charset="0"/>
               </a:rPr>
-              <a:t>  </a:t>
-            </a:r>
-            <a:r>
-              <a:rPr lang="en-US" sz="2000" b="1" noProof="1">
-                <a:solidFill>
-                  <a:srgbClr val="8CF4F2"/>
-                </a:solidFill>
-                <a:effectLst>
-                  <a:outerShdw blurRad="38100" dist="38100" dir="2700000" algn="tl">
-                    <a:srgbClr val="000000">
-                      <a:alpha val="43137"/>
-                    </a:srgbClr>
-                  </a:outerShdw>
-                </a:effectLst>
-                <a:latin typeface="Consolas" pitchFamily="49" charset="0"/>
-                <a:cs typeface="Consolas" pitchFamily="49" charset="0"/>
-              </a:rPr>
-              <a:t>call     </a:t>
+              <a:t>  call     </a:t>
             </a:r>
             <a:r>
               <a:rPr lang="en-US" sz="2000" b="1" noProof="1" smtClean="0">
@@ -23593,23 +23613,7 @@
                 </a:effectLst>
                 <a:cs typeface="Consolas" pitchFamily="49" charset="0"/>
               </a:rPr>
-              <a:t>When </a:t>
-            </a:r>
-            <a:r>
-              <a:rPr lang="en-US" sz="2000" b="1" noProof="1" smtClean="0">
-                <a:solidFill>
-                  <a:srgbClr val="F7FFE7"/>
-                </a:solidFill>
-                <a:effectLst>
-                  <a:outerShdw blurRad="38100" dist="38100" dir="2700000" algn="tl">
-                    <a:srgbClr val="000000">
-                      <a:alpha val="43137"/>
-                    </a:srgbClr>
-                  </a:outerShdw>
-                </a:effectLst>
-                <a:cs typeface="Consolas" pitchFamily="49" charset="0"/>
-              </a:rPr>
-              <a:t>given method is called for the first time</a:t>
+              <a:t>When given method is called for the first time</a:t>
             </a:r>
           </a:p>
         </p:txBody>
@@ -23681,53 +23685,8 @@
                 </a:effectLst>
                 <a:cs typeface="Consolas" pitchFamily="49" charset="0"/>
               </a:rPr>
-              <a:t>Pre-compilation </a:t>
-            </a:r>
-            <a:r>
-              <a:rPr lang="en-US" sz="2000" b="1" noProof="1" smtClean="0">
-                <a:solidFill>
-                  <a:srgbClr val="F7FFE7"/>
-                </a:solidFill>
-                <a:effectLst>
-                  <a:outerShdw blurRad="38100" dist="38100" dir="2700000" algn="tl">
-                    <a:srgbClr val="000000">
-                      <a:alpha val="43137"/>
-                    </a:srgbClr>
-                  </a:outerShdw>
-                </a:effectLst>
-                <a:cs typeface="Consolas" pitchFamily="49" charset="0"/>
-              </a:rPr>
-              <a:t>during </a:t>
-            </a:r>
-            <a:r>
-              <a:rPr lang="en-US" sz="2000" b="1" noProof="1" smtClean="0">
-                <a:solidFill>
-                  <a:srgbClr val="F7FFE7"/>
-                </a:solidFill>
-                <a:effectLst>
-                  <a:outerShdw blurRad="38100" dist="38100" dir="2700000" algn="tl">
-                    <a:srgbClr val="000000">
-                      <a:alpha val="43137"/>
-                    </a:srgbClr>
-                  </a:outerShdw>
-                </a:effectLst>
-                <a:cs typeface="Consolas" pitchFamily="49" charset="0"/>
-              </a:rPr>
-              <a:t>the install (NGEN)</a:t>
-            </a:r>
-            <a:endParaRPr lang="en-US" sz="2000" b="1" noProof="1" smtClean="0">
-              <a:solidFill>
-                <a:srgbClr val="F7FFE7"/>
-              </a:solidFill>
-              <a:effectLst>
-                <a:outerShdw blurRad="38100" dist="38100" dir="2700000" algn="tl">
-                  <a:srgbClr val="000000">
-                    <a:alpha val="43137"/>
-                  </a:srgbClr>
-                </a:outerShdw>
-              </a:effectLst>
-              <a:cs typeface="Consolas" pitchFamily="49" charset="0"/>
-            </a:endParaRPr>
+              <a:t>Pre-compilation during the install (NGEN)</a:t>
+            </a:r>
           </a:p>
         </p:txBody>
       </p:sp>
@@ -24710,6 +24669,34 @@
           </a:p>
         </p:txBody>
       </p:sp>
+      <p:pic>
+        <p:nvPicPr>
+          <p:cNvPr id="104450" name="Picture 2" descr="http://image.guardian.co.uk/sys-images/Arts/Arts_/Pictures/2007/12/14/books460.jpg"/>
+          <p:cNvPicPr>
+            <a:picLocks noChangeAspect="1" noChangeArrowheads="1"/>
+          </p:cNvPicPr>
+          <p:nvPr/>
+        </p:nvPicPr>
+        <p:blipFill>
+          <a:blip r:embed="rId3" cstate="print"/>
+          <a:srcRect/>
+          <a:stretch>
+            <a:fillRect/>
+          </a:stretch>
+        </p:blipFill>
+        <p:spPr bwMode="auto">
+          <a:xfrm>
+            <a:off x="6096000" y="4867088"/>
+            <a:ext cx="2514600" cy="1508760"/>
+          </a:xfrm>
+          <a:prstGeom prst="roundRect">
+            <a:avLst>
+              <a:gd name="adj" fmla="val 6011"/>
+            </a:avLst>
+          </a:prstGeom>
+          <a:noFill/>
+        </p:spPr>
+      </p:pic>
     </p:spTree>
   </p:cSld>
   <p:clrMapOvr>
@@ -26590,7 +26577,7 @@
         </p:nvSpPr>
         <p:spPr>
           <a:xfrm>
-            <a:off x="1246692" y="2667000"/>
+            <a:off x="1246692" y="4260058"/>
             <a:ext cx="6480175" cy="736600"/>
           </a:xfrm>
         </p:spPr>
@@ -26604,10 +26591,10 @@
               </a:lnSpc>
             </a:pPr>
             <a:r>
-              <a:rPr lang="en-US"/>
+              <a:rPr lang="en-US" dirty="0"/>
               <a:t>.NET Applications</a:t>
             </a:r>
-            <a:endParaRPr lang="bg-BG"/>
+            <a:endParaRPr lang="bg-BG" dirty="0"/>
           </a:p>
         </p:txBody>
       </p:sp>
@@ -26623,7 +26610,7 @@
         </p:nvSpPr>
         <p:spPr>
           <a:xfrm>
-            <a:off x="914400" y="3548062"/>
+            <a:off x="914400" y="5141120"/>
             <a:ext cx="7145842" cy="497680"/>
           </a:xfrm>
         </p:spPr>
@@ -26639,6 +26626,60 @@
           </a:p>
         </p:txBody>
       </p:sp>
+      <p:pic>
+        <p:nvPicPr>
+          <p:cNvPr id="50178" name="Picture 2" descr="http://it.bluent.com/images/software-application.jpg"/>
+          <p:cNvPicPr>
+            <a:picLocks noChangeAspect="1" noChangeArrowheads="1"/>
+          </p:cNvPicPr>
+          <p:nvPr/>
+        </p:nvPicPr>
+        <p:blipFill>
+          <a:blip r:embed="rId3" cstate="print"/>
+          <a:srcRect/>
+          <a:stretch>
+            <a:fillRect/>
+          </a:stretch>
+        </p:blipFill>
+        <p:spPr bwMode="auto">
+          <a:xfrm>
+            <a:off x="2438400" y="1516858"/>
+            <a:ext cx="4114800" cy="2301240"/>
+          </a:xfrm>
+          <a:prstGeom prst="roundRect">
+            <a:avLst>
+              <a:gd name="adj" fmla="val 8283"/>
+            </a:avLst>
+          </a:prstGeom>
+          <a:noFill/>
+        </p:spPr>
+      </p:pic>
+      <p:pic>
+        <p:nvPicPr>
+          <p:cNvPr id="50179" name="Picture 3" descr="C:\Trash\ms.net-logo-blue.jpg"/>
+          <p:cNvPicPr>
+            <a:picLocks noChangeAspect="1" noChangeArrowheads="1"/>
+          </p:cNvPicPr>
+          <p:nvPr/>
+        </p:nvPicPr>
+        <p:blipFill>
+          <a:blip r:embed="rId4" cstate="print"/>
+          <a:srcRect/>
+          <a:stretch>
+            <a:fillRect/>
+          </a:stretch>
+        </p:blipFill>
+        <p:spPr bwMode="auto">
+          <a:xfrm>
+            <a:off x="4303324" y="1219200"/>
+            <a:ext cx="1838510" cy="895350"/>
+          </a:xfrm>
+          <a:prstGeom prst="roundRect">
+            <a:avLst/>
+          </a:prstGeom>
+          <a:noFill/>
+        </p:spPr>
+      </p:pic>
     </p:spTree>
   </p:cSld>
   <p:clrMapOvr>
@@ -26744,19 +26785,7 @@
             </a:pPr>
             <a:r>
               <a:rPr lang="en-US" dirty="0" smtClean="0"/>
-              <a:t>Stored in .DLL </a:t>
-            </a:r>
-            <a:r>
-              <a:rPr lang="en-US" dirty="0" smtClean="0"/>
-              <a:t>and </a:t>
-            </a:r>
-            <a:r>
-              <a:rPr lang="en-US" dirty="0" smtClean="0"/>
-              <a:t>.EXE </a:t>
-            </a:r>
-            <a:r>
-              <a:rPr lang="en-US" dirty="0" smtClean="0"/>
-              <a:t>files</a:t>
+              <a:t>Stored in .DLL and .EXE files</a:t>
             </a:r>
           </a:p>
           <a:p>
@@ -27360,39 +27389,7 @@
             <a:p>
               <a:r>
                 <a:rPr lang="en-US" sz="2000" b="1" dirty="0" smtClean="0"/>
-                <a:t>Classes, interfaces, inner </a:t>
-              </a:r>
-              <a:r>
-                <a:rPr lang="en-US" sz="2000" b="1" dirty="0" smtClean="0"/>
-                <a:t>types, base </a:t>
-              </a:r>
-              <a:r>
-                <a:rPr lang="en-US" sz="2000" b="1" dirty="0" smtClean="0"/>
-                <a:t>classes, </a:t>
-              </a:r>
-              <a:r>
-                <a:rPr lang="en-US" sz="2000" b="1" dirty="0" smtClean="0"/>
-                <a:t>implemented interfaces</a:t>
-              </a:r>
-              <a:r>
-                <a:rPr lang="en-US" sz="2000" b="1" dirty="0" smtClean="0"/>
-                <a:t>, member fields, </a:t>
-              </a:r>
-              <a:r>
-                <a:rPr lang="en-US" sz="2000" b="1" dirty="0" smtClean="0"/>
-                <a:t> properties</a:t>
-              </a:r>
-              <a:r>
-                <a:rPr lang="en-US" sz="2000" b="1" dirty="0" smtClean="0"/>
-                <a:t>, methods, </a:t>
-              </a:r>
-              <a:r>
-                <a:rPr lang="en-US" sz="2000" b="1" dirty="0" smtClean="0"/>
-                <a:t>method parameters</a:t>
-              </a:r>
-              <a:r>
-                <a:rPr lang="en-US" sz="2000" b="1" dirty="0" smtClean="0"/>
-                <a:t>, return value,</a:t>
+                <a:t>Classes, interfaces, inner types, base classes, implemented interfaces, member fields,  properties, methods, method parameters, return value,</a:t>
               </a:r>
             </a:p>
             <a:p>
@@ -27570,37 +27567,7 @@
                     </a:outerShdw>
                   </a:effectLst>
                 </a:rPr>
-                <a:t>Dependencies </a:t>
-              </a:r>
-              <a:r>
-                <a:rPr lang="en-US" sz="1800" b="1" dirty="0" smtClean="0">
-                  <a:solidFill>
-                    <a:srgbClr val="FFFFFF"/>
-                  </a:solidFill>
-                  <a:effectLst>
-                    <a:outerShdw blurRad="38100" dist="38100" dir="2700000" algn="tl">
-                      <a:srgbClr val="000000">
-                        <a:alpha val="43137"/>
-                      </a:srgbClr>
-                    </a:outerShdw>
-                  </a:effectLst>
-                </a:rPr>
-                <a:t>on other </a:t>
-              </a:r>
-              <a:r>
-                <a:rPr lang="en-US" sz="1800" b="1" dirty="0" smtClean="0">
-                  <a:solidFill>
-                    <a:srgbClr val="FFFFFF"/>
-                  </a:solidFill>
-                  <a:effectLst>
-                    <a:outerShdw blurRad="38100" dist="38100" dir="2700000" algn="tl">
-                      <a:srgbClr val="000000">
-                        <a:alpha val="43137"/>
-                      </a:srgbClr>
-                    </a:outerShdw>
-                  </a:effectLst>
-                </a:rPr>
-                <a:t>assemblies</a:t>
+                <a:t>Dependencies on other assemblies</a:t>
               </a:r>
               <a:endParaRPr lang="bg-BG" sz="1800" b="1" dirty="0" smtClean="0">
                 <a:solidFill>
@@ -28172,6 +28139,44 @@
           <a:chExt cx="0" cy="0"/>
         </a:xfrm>
       </p:grpSpPr>
+      <p:pic>
+        <p:nvPicPr>
+          <p:cNvPr id="39938" name="Picture 2" descr="http://www.bull.us/bull_services/outsourcing/profserv/infrastructure.gif"/>
+          <p:cNvPicPr>
+            <a:picLocks noChangeAspect="1" noChangeArrowheads="1"/>
+          </p:cNvPicPr>
+          <p:nvPr/>
+        </p:nvPicPr>
+        <p:blipFill>
+          <a:blip r:embed="rId3" cstate="print"/>
+          <a:srcRect/>
+          <a:stretch>
+            <a:fillRect/>
+          </a:stretch>
+        </p:blipFill>
+        <p:spPr bwMode="auto">
+          <a:xfrm>
+            <a:off x="2133600" y="990600"/>
+            <a:ext cx="4800600" cy="2743200"/>
+          </a:xfrm>
+          <a:prstGeom prst="roundRect">
+            <a:avLst>
+              <a:gd name="adj" fmla="val 5664"/>
+            </a:avLst>
+          </a:prstGeom>
+          <a:solidFill>
+            <a:srgbClr val="FFFFFF">
+              <a:shade val="85000"/>
+            </a:srgbClr>
+          </a:solidFill>
+          <a:ln>
+            <a:noFill/>
+          </a:ln>
+          <a:effectLst>
+            <a:reflection blurRad="12700" stA="38000" endPos="28000" dist="5000" dir="5400000" sy="-100000" algn="bl" rotWithShape="0"/>
+          </a:effectLst>
+        </p:spPr>
+      </p:pic>
       <p:sp>
         <p:nvSpPr>
           <p:cNvPr id="1576962" name="Rectangle 2"/>
@@ -28184,7 +28189,7 @@
         </p:nvSpPr>
         <p:spPr>
           <a:xfrm>
-            <a:off x="1216025" y="2133600"/>
+            <a:off x="1216025" y="4015583"/>
             <a:ext cx="6480175" cy="1473200"/>
           </a:xfrm>
         </p:spPr>
@@ -28217,7 +28222,7 @@
         </p:nvSpPr>
         <p:spPr>
           <a:xfrm>
-            <a:off x="914400" y="3792537"/>
+            <a:off x="914400" y="5674520"/>
             <a:ext cx="7145842" cy="497680"/>
           </a:xfrm>
         </p:spPr>
@@ -28311,13 +28316,8 @@
           <a:p>
             <a:r>
               <a:rPr lang="en-US" dirty="0" smtClean="0"/>
-              <a:t>Common Language </a:t>
-            </a:r>
-            <a:r>
-              <a:rPr lang="en-US" dirty="0" smtClean="0"/>
-              <a:t>Infrastructure (CLI)</a:t>
-            </a:r>
-            <a:endParaRPr lang="en-US" dirty="0" smtClean="0"/>
+              <a:t>Common Language Infrastructure (CLI)</a:t>
+            </a:r>
           </a:p>
           <a:p>
             <a:pPr lvl="1"/>
@@ -28365,15 +28365,7 @@
             </a:r>
             <a:r>
               <a:rPr lang="en-US" dirty="0" smtClean="0"/>
-              <a:t>CLI </a:t>
-            </a:r>
-            <a:r>
-              <a:rPr lang="en-US" dirty="0" smtClean="0"/>
-              <a:t>implementation for </a:t>
-            </a:r>
-            <a:r>
-              <a:rPr lang="en-US" dirty="0" smtClean="0"/>
-              <a:t>Windows</a:t>
+              <a:t>CLI implementation for Windows</a:t>
             </a:r>
           </a:p>
           <a:p>
@@ -28689,7 +28681,7 @@
         </p:nvSpPr>
         <p:spPr>
           <a:xfrm>
-            <a:off x="1330325" y="2463800"/>
+            <a:off x="1330325" y="4175920"/>
             <a:ext cx="6480175" cy="736600"/>
           </a:xfrm>
         </p:spPr>
@@ -28722,7 +28714,7 @@
         </p:nvSpPr>
         <p:spPr>
           <a:xfrm>
-            <a:off x="2438400" y="3352800"/>
+            <a:off x="2438400" y="5064920"/>
             <a:ext cx="4267200" cy="954880"/>
           </a:xfrm>
         </p:spPr>
@@ -28738,6 +28730,46 @@
           </a:p>
         </p:txBody>
       </p:sp>
+      <p:pic>
+        <p:nvPicPr>
+          <p:cNvPr id="102401" name="Picture 1" descr="C:\Trash\ms.net-logo-blue.jpg"/>
+          <p:cNvPicPr>
+            <a:picLocks noChangeAspect="1" noChangeArrowheads="1"/>
+          </p:cNvPicPr>
+          <p:nvPr/>
+        </p:nvPicPr>
+        <p:blipFill>
+          <a:blip r:embed="rId3" cstate="print">
+            <a:lum bright="10000" contrast="30000"/>
+          </a:blip>
+          <a:srcRect/>
+          <a:stretch>
+            <a:fillRect/>
+          </a:stretch>
+        </p:blipFill>
+        <p:spPr bwMode="auto">
+          <a:xfrm>
+            <a:off x="1905002" y="1175247"/>
+            <a:ext cx="5333998" cy="2597644"/>
+          </a:xfrm>
+          <a:prstGeom prst="roundRect">
+            <a:avLst>
+              <a:gd name="adj" fmla="val 7821"/>
+            </a:avLst>
+          </a:prstGeom>
+          <a:solidFill>
+            <a:srgbClr val="FFFFFF">
+              <a:shade val="85000"/>
+            </a:srgbClr>
+          </a:solidFill>
+          <a:ln>
+            <a:noFill/>
+          </a:ln>
+          <a:effectLst>
+            <a:reflection blurRad="12700" stA="38000" endPos="28000" dist="5000" dir="5400000" sy="-100000" algn="bl" rotWithShape="0"/>
+          </a:effectLst>
+        </p:spPr>
+      </p:pic>
     </p:spTree>
   </p:cSld>
   <p:clrMapOvr>
@@ -28835,15 +28867,7 @@
             </a:r>
             <a:r>
               <a:rPr lang="en-US" dirty="0" smtClean="0"/>
-              <a:t>data level </a:t>
-            </a:r>
-            <a:r>
-              <a:rPr lang="en-US" dirty="0" smtClean="0"/>
-              <a:t>compatibility </a:t>
-            </a:r>
-            <a:r>
-              <a:rPr lang="en-US" dirty="0" smtClean="0"/>
-              <a:t>between </a:t>
+              <a:t>data level compatibility between </a:t>
             </a:r>
             <a:r>
               <a:rPr lang="en-US" dirty="0"/>
@@ -29294,6 +29318,44 @@
           <a:chExt cx="0" cy="0"/>
         </a:xfrm>
       </p:grpSpPr>
+      <p:pic>
+        <p:nvPicPr>
+          <p:cNvPr id="28674" name="Picture 2" descr="http://triton.towson.edu/users/bhendr1/pics/programming.jpg"/>
+          <p:cNvPicPr>
+            <a:picLocks noChangeAspect="1" noChangeArrowheads="1"/>
+          </p:cNvPicPr>
+          <p:nvPr/>
+        </p:nvPicPr>
+        <p:blipFill>
+          <a:blip r:embed="rId3" cstate="print"/>
+          <a:srcRect/>
+          <a:stretch>
+            <a:fillRect/>
+          </a:stretch>
+        </p:blipFill>
+        <p:spPr bwMode="auto">
+          <a:xfrm>
+            <a:off x="2133600" y="820370"/>
+            <a:ext cx="4610100" cy="3531336"/>
+          </a:xfrm>
+          <a:prstGeom prst="roundRect">
+            <a:avLst>
+              <a:gd name="adj" fmla="val 2810"/>
+            </a:avLst>
+          </a:prstGeom>
+          <a:solidFill>
+            <a:srgbClr val="FFFFFF">
+              <a:shade val="85000"/>
+            </a:srgbClr>
+          </a:solidFill>
+          <a:ln>
+            <a:noFill/>
+          </a:ln>
+          <a:effectLst>
+            <a:reflection blurRad="12700" stA="38000" endPos="28000" dist="5000" dir="5400000" sy="-100000" algn="bl" rotWithShape="0"/>
+          </a:effectLst>
+        </p:spPr>
+      </p:pic>
       <p:sp>
         <p:nvSpPr>
           <p:cNvPr id="1581058" name="Rectangle 2"/>
@@ -29306,7 +29368,7 @@
         </p:nvSpPr>
         <p:spPr>
           <a:xfrm>
-            <a:off x="924448" y="2667000"/>
+            <a:off x="924448" y="4648200"/>
             <a:ext cx="7153276" cy="965200"/>
           </a:xfrm>
         </p:spPr>
@@ -29339,7 +29401,7 @@
         </p:nvSpPr>
         <p:spPr>
           <a:xfrm>
-            <a:off x="924971" y="3733800"/>
+            <a:off x="924971" y="5638800"/>
             <a:ext cx="7145842" cy="497680"/>
           </a:xfrm>
         </p:spPr>
@@ -29461,11 +29523,7 @@
             </a:r>
             <a:r>
               <a:rPr lang="en-US" dirty="0" smtClean="0"/>
-              <a:t>VB.NET, Managed </a:t>
-            </a:r>
-            <a:r>
-              <a:rPr lang="en-US" dirty="0" smtClean="0"/>
-              <a:t>C</a:t>
+              <a:t>VB.NET, Managed C</a:t>
             </a:r>
             <a:r>
               <a:rPr lang="en-US" dirty="0"/>
@@ -29540,11 +29598,7 @@
             </a:pPr>
             <a:r>
               <a:rPr lang="en-US" dirty="0" smtClean="0"/>
-              <a:t>Cross</a:t>
-            </a:r>
-            <a:r>
-              <a:rPr lang="en-US" dirty="0" smtClean="0"/>
-              <a:t>-language inheritance of </a:t>
+              <a:t>Cross-language inheritance of </a:t>
             </a:r>
             <a:r>
               <a:rPr lang="en-US" dirty="0"/>
@@ -29776,11 +29830,7 @@
             </a:pPr>
             <a:r>
               <a:rPr lang="en-US" dirty="0" smtClean="0"/>
-              <a:t>XML based </a:t>
-            </a:r>
-            <a:r>
-              <a:rPr lang="en-US" dirty="0" smtClean="0"/>
-              <a:t>documentation</a:t>
+              <a:t>XML based documentation</a:t>
             </a:r>
           </a:p>
           <a:p>
@@ -29827,11 +29877,7 @@
             </a:r>
             <a:r>
               <a:rPr lang="en-US" dirty="0" smtClean="0"/>
-              <a:t> </a:t>
-            </a:r>
-            <a:r>
-              <a:rPr lang="en-US" dirty="0" smtClean="0"/>
-              <a:t>is a valid call</a:t>
+              <a:t> is a valid call</a:t>
             </a:r>
             <a:endParaRPr lang="en-US" dirty="0"/>
           </a:p>
@@ -30015,24 +30061,7 @@
                 <a:latin typeface="Consolas" pitchFamily="49" charset="0"/>
                 <a:cs typeface="Consolas" pitchFamily="49" charset="0"/>
               </a:rPr>
-              <a:t>using </a:t>
-            </a:r>
-            <a:r>
-              <a:rPr lang="en-US" sz="1800" b="1" noProof="1">
-                <a:solidFill>
-                  <a:srgbClr val="8CF4F2"/>
-                </a:solidFill>
-                <a:effectLst>
-                  <a:outerShdw blurRad="38100" dist="38100" dir="2700000" algn="tl">
-                    <a:srgbClr val="000000">
-                      <a:alpha val="43137"/>
-                    </a:srgbClr>
-                  </a:outerShdw>
-                </a:effectLst>
-                <a:latin typeface="Consolas" pitchFamily="49" charset="0"/>
-                <a:cs typeface="Consolas" pitchFamily="49" charset="0"/>
-              </a:rPr>
-              <a:t>System</a:t>
+              <a:t>using System</a:t>
             </a:r>
             <a:r>
               <a:rPr lang="en-US" sz="1800" b="1" noProof="1" smtClean="0">
@@ -30382,24 +30411,7 @@
                 <a:latin typeface="Consolas" pitchFamily="49" charset="0"/>
                 <a:cs typeface="Consolas" pitchFamily="49" charset="0"/>
               </a:rPr>
-              <a:t> </a:t>
-            </a:r>
-            <a:r>
-              <a:rPr lang="en-US" sz="1800" b="1" noProof="1" smtClean="0">
-                <a:solidFill>
-                  <a:srgbClr val="8CF4F2"/>
-                </a:solidFill>
-                <a:effectLst>
-                  <a:outerShdw blurRad="38100" dist="38100" dir="2700000" algn="tl">
-                    <a:srgbClr val="000000">
-                      <a:alpha val="43137"/>
-                    </a:srgbClr>
-                  </a:outerShdw>
-                </a:effectLst>
-                <a:latin typeface="Consolas" pitchFamily="49" charset="0"/>
-                <a:cs typeface="Consolas" pitchFamily="49" charset="0"/>
-              </a:rPr>
-              <a:t>           Console.WriteLine(i);</a:t>
+              <a:t>            Console.WriteLine(i);</a:t>
             </a:r>
           </a:p>
           <a:p>
@@ -30433,24 +30445,7 @@
                 <a:latin typeface="Consolas" pitchFamily="49" charset="0"/>
                 <a:cs typeface="Consolas" pitchFamily="49" charset="0"/>
               </a:rPr>
-              <a:t> </a:t>
-            </a:r>
-            <a:r>
-              <a:rPr lang="en-US" sz="1800" b="1" noProof="1" smtClean="0">
-                <a:solidFill>
-                  <a:srgbClr val="8CF4F2"/>
-                </a:solidFill>
-                <a:effectLst>
-                  <a:outerShdw blurRad="38100" dist="38100" dir="2700000" algn="tl">
-                    <a:srgbClr val="000000">
-                      <a:alpha val="43137"/>
-                    </a:srgbClr>
-                  </a:outerShdw>
-                </a:effectLst>
-                <a:latin typeface="Consolas" pitchFamily="49" charset="0"/>
-                <a:cs typeface="Consolas" pitchFamily="49" charset="0"/>
-              </a:rPr>
-              <a:t>       }</a:t>
+              <a:t>        }</a:t>
             </a:r>
             <a:endParaRPr lang="en-US" sz="1800" b="1" noProof="1">
               <a:solidFill>
@@ -30582,7 +30577,7 @@
         </p:nvSpPr>
         <p:spPr>
           <a:xfrm>
-            <a:off x="1187450" y="2209800"/>
+            <a:off x="1187450" y="3998120"/>
             <a:ext cx="6480175" cy="1473200"/>
           </a:xfrm>
         </p:spPr>
@@ -30615,7 +30610,7 @@
         </p:nvSpPr>
         <p:spPr>
           <a:xfrm>
-            <a:off x="914400" y="3886200"/>
+            <a:off x="914400" y="5674520"/>
             <a:ext cx="7145842" cy="497680"/>
           </a:xfrm>
         </p:spPr>
@@ -30631,6 +30626,37 @@
           </a:p>
         </p:txBody>
       </p:sp>
+      <p:pic>
+        <p:nvPicPr>
+          <p:cNvPr id="20482" name="Picture 2" descr="http://www.textually.org/textually/archives/images/set3/local-library-tip-lg.jpg"/>
+          <p:cNvPicPr>
+            <a:picLocks noChangeAspect="1" noChangeArrowheads="1"/>
+          </p:cNvPicPr>
+          <p:nvPr/>
+        </p:nvPicPr>
+        <p:blipFill>
+          <a:blip r:embed="rId3" cstate="print"/>
+          <a:srcRect/>
+          <a:stretch>
+            <a:fillRect/>
+          </a:stretch>
+        </p:blipFill>
+        <p:spPr bwMode="auto">
+          <a:xfrm>
+            <a:off x="2362200" y="781878"/>
+            <a:ext cx="3771900" cy="2951922"/>
+          </a:xfrm>
+          <a:prstGeom prst="rect">
+            <a:avLst/>
+          </a:prstGeom>
+          <a:ln>
+            <a:noFill/>
+          </a:ln>
+          <a:effectLst>
+            <a:softEdge rad="112500"/>
+          </a:effectLst>
+        </p:spPr>
+      </p:pic>
     </p:spTree>
   </p:cSld>
   <p:clrMapOvr>
@@ -30927,43 +30953,7 @@
                   </a:outerShdw>
                 </a:effectLst>
               </a:rPr>
-              <a:t>XML (</a:t>
-            </a:r>
-            <a:r>
-              <a:rPr lang="en-US" sz="2400" b="1" dirty="0" smtClean="0">
-                <a:solidFill>
-                  <a:schemeClr val="tx1">
-                    <a:lumMod val="60000"/>
-                    <a:lumOff val="40000"/>
-                  </a:schemeClr>
-                </a:solidFill>
-                <a:effectLst>
-                  <a:outerShdw blurRad="38100" dist="38100" dir="2700000" algn="tl">
-                    <a:srgbClr val="000000">
-                      <a:alpha val="43137"/>
-                    </a:srgbClr>
-                  </a:outerShdw>
-                </a:effectLst>
-              </a:rPr>
-              <a:t>Data Tier</a:t>
-            </a:r>
-            <a:r>
-              <a:rPr lang="en-US" sz="2400" b="1" dirty="0" smtClean="0">
-                <a:solidFill>
-                  <a:schemeClr val="tx1">
-                    <a:lumMod val="60000"/>
-                    <a:lumOff val="40000"/>
-                  </a:schemeClr>
-                </a:solidFill>
-                <a:effectLst>
-                  <a:outerShdw blurRad="38100" dist="38100" dir="2700000" algn="tl">
-                    <a:srgbClr val="000000">
-                      <a:alpha val="43137"/>
-                    </a:srgbClr>
-                  </a:outerShdw>
-                </a:effectLst>
-              </a:rPr>
-              <a:t>)</a:t>
+              <a:t>XML (Data Tier)</a:t>
             </a:r>
             <a:endParaRPr lang="en-US" sz="2400" b="1" dirty="0">
               <a:solidFill>
@@ -31043,43 +31033,7 @@
                   </a:outerShdw>
                 </a:effectLst>
               </a:rPr>
-              <a:t>WCF and WWF (Communication and Workflow </a:t>
-            </a:r>
-            <a:r>
-              <a:rPr lang="en-US" sz="2400" b="1" dirty="0" smtClean="0">
-                <a:solidFill>
-                  <a:schemeClr val="tx1">
-                    <a:lumMod val="60000"/>
-                    <a:lumOff val="40000"/>
-                  </a:schemeClr>
-                </a:solidFill>
-                <a:effectLst>
-                  <a:outerShdw blurRad="38100" dist="38100" dir="2700000" algn="tl">
-                    <a:srgbClr val="000000">
-                      <a:alpha val="43137"/>
-                    </a:srgbClr>
-                  </a:outerShdw>
-                </a:effectLst>
-              </a:rPr>
-              <a:t>Tier</a:t>
-            </a:r>
-            <a:r>
-              <a:rPr lang="en-US" sz="2400" b="1" dirty="0" smtClean="0">
-                <a:solidFill>
-                  <a:schemeClr val="tx1">
-                    <a:lumMod val="60000"/>
-                    <a:lumOff val="40000"/>
-                  </a:schemeClr>
-                </a:solidFill>
-                <a:effectLst>
-                  <a:outerShdw blurRad="38100" dist="38100" dir="2700000" algn="tl">
-                    <a:srgbClr val="000000">
-                      <a:alpha val="43137"/>
-                    </a:srgbClr>
-                  </a:outerShdw>
-                </a:effectLst>
-              </a:rPr>
-              <a:t>)</a:t>
+              <a:t>WCF and WWF (Communication and Workflow Tier)</a:t>
             </a:r>
             <a:endParaRPr lang="en-US" sz="2400" b="1" dirty="0">
               <a:solidFill>
@@ -31667,43 +31621,7 @@
                   </a:outerShdw>
                 </a:effectLst>
               </a:rPr>
-              <a:t>XML (</a:t>
-            </a:r>
-            <a:r>
-              <a:rPr lang="en-US" sz="2400" b="1" dirty="0" smtClean="0">
-                <a:solidFill>
-                  <a:schemeClr val="tx1">
-                    <a:lumMod val="60000"/>
-                    <a:lumOff val="40000"/>
-                  </a:schemeClr>
-                </a:solidFill>
-                <a:effectLst>
-                  <a:outerShdw blurRad="38100" dist="38100" dir="2700000" algn="tl">
-                    <a:srgbClr val="000000">
-                      <a:alpha val="43137"/>
-                    </a:srgbClr>
-                  </a:outerShdw>
-                </a:effectLst>
-              </a:rPr>
-              <a:t>Data Tier</a:t>
-            </a:r>
-            <a:r>
-              <a:rPr lang="en-US" sz="2400" b="1" dirty="0" smtClean="0">
-                <a:solidFill>
-                  <a:schemeClr val="tx1">
-                    <a:lumMod val="60000"/>
-                    <a:lumOff val="40000"/>
-                  </a:schemeClr>
-                </a:solidFill>
-                <a:effectLst>
-                  <a:outerShdw blurRad="38100" dist="38100" dir="2700000" algn="tl">
-                    <a:srgbClr val="000000">
-                      <a:alpha val="43137"/>
-                    </a:srgbClr>
-                  </a:outerShdw>
-                </a:effectLst>
-              </a:rPr>
-              <a:t>)</a:t>
+              <a:t>XML (Data Tier)</a:t>
             </a:r>
             <a:endParaRPr lang="en-US" sz="2400" b="1" dirty="0">
               <a:solidFill>
@@ -31787,43 +31705,7 @@
                   </a:outerShdw>
                 </a:effectLst>
               </a:rPr>
-              <a:t>WCF and WWF (Communication and Workflow </a:t>
-            </a:r>
-            <a:r>
-              <a:rPr lang="en-US" sz="2400" b="1" dirty="0" smtClean="0">
-                <a:solidFill>
-                  <a:schemeClr val="tx1">
-                    <a:lumMod val="60000"/>
-                    <a:lumOff val="40000"/>
-                  </a:schemeClr>
-                </a:solidFill>
-                <a:effectLst>
-                  <a:outerShdw blurRad="38100" dist="38100" dir="2700000" algn="tl">
-                    <a:srgbClr val="000000">
-                      <a:alpha val="43137"/>
-                    </a:srgbClr>
-                  </a:outerShdw>
-                </a:effectLst>
-              </a:rPr>
-              <a:t>Tier</a:t>
-            </a:r>
-            <a:r>
-              <a:rPr lang="en-US" sz="2400" b="1" dirty="0" smtClean="0">
-                <a:solidFill>
-                  <a:schemeClr val="tx1">
-                    <a:lumMod val="60000"/>
-                    <a:lumOff val="40000"/>
-                  </a:schemeClr>
-                </a:solidFill>
-                <a:effectLst>
-                  <a:outerShdw blurRad="38100" dist="38100" dir="2700000" algn="tl">
-                    <a:srgbClr val="000000">
-                      <a:alpha val="43137"/>
-                    </a:srgbClr>
-                  </a:outerShdw>
-                </a:effectLst>
-              </a:rPr>
-              <a:t>)</a:t>
+              <a:t>WCF and WWF (Communication and Workflow Tier)</a:t>
             </a:r>
             <a:endParaRPr lang="en-US" sz="2400" b="1" dirty="0">
               <a:solidFill>
@@ -34553,14 +34435,6 @@
               </a:rPr>
               <a:t>System.ServiceModel</a:t>
             </a:r>
-            <a:endParaRPr lang="en-US" sz="1400" noProof="1">
-              <a:solidFill>
-                <a:schemeClr val="tx1">
-                  <a:lumMod val="40000"/>
-                  <a:lumOff val="60000"/>
-                </a:schemeClr>
-              </a:solidFill>
-            </a:endParaRPr>
           </a:p>
         </p:txBody>
       </p:sp>
@@ -36983,7 +36857,7 @@
         </p:nvSpPr>
         <p:spPr>
           <a:xfrm>
-            <a:off x="1260512" y="2667000"/>
+            <a:off x="1260512" y="4419600"/>
             <a:ext cx="6480175" cy="736600"/>
           </a:xfrm>
         </p:spPr>
@@ -36997,10 +36871,10 @@
               </a:lnSpc>
             </a:pPr>
             <a:r>
-              <a:rPr lang="en-US"/>
+              <a:rPr lang="en-US" dirty="0"/>
               <a:t>Visual Studio IDE</a:t>
             </a:r>
-            <a:endParaRPr lang="bg-BG"/>
+            <a:endParaRPr lang="bg-BG" dirty="0"/>
           </a:p>
         </p:txBody>
       </p:sp>
@@ -37016,7 +36890,7 @@
         </p:nvSpPr>
         <p:spPr>
           <a:xfrm>
-            <a:off x="931358" y="3540920"/>
+            <a:off x="931358" y="5293520"/>
             <a:ext cx="7145842" cy="497680"/>
           </a:xfrm>
         </p:spPr>
@@ -37032,6 +36906,42 @@
           </a:p>
         </p:txBody>
       </p:sp>
+      <p:pic>
+        <p:nvPicPr>
+          <p:cNvPr id="14338" name="Picture 2" descr="http://blogs.aspitalia.com/img/m.casati/netframework4.0beta2visualstudio2010_1482c/vs2010-logo_2.gif"/>
+          <p:cNvPicPr>
+            <a:picLocks noChangeAspect="1" noChangeArrowheads="1"/>
+          </p:cNvPicPr>
+          <p:nvPr/>
+        </p:nvPicPr>
+        <p:blipFill>
+          <a:blip r:embed="rId3" cstate="print"/>
+          <a:srcRect/>
+          <a:stretch>
+            <a:fillRect/>
+          </a:stretch>
+        </p:blipFill>
+        <p:spPr bwMode="auto">
+          <a:xfrm>
+            <a:off x="2286000" y="1600200"/>
+            <a:ext cx="4456652" cy="1905000"/>
+          </a:xfrm>
+          <a:prstGeom prst="roundRect">
+            <a:avLst>
+              <a:gd name="adj" fmla="val 8594"/>
+            </a:avLst>
+          </a:prstGeom>
+          <a:solidFill>
+            <a:srgbClr val="FFFFFF"/>
+          </a:solidFill>
+          <a:ln>
+            <a:noFill/>
+          </a:ln>
+          <a:effectLst>
+            <a:reflection blurRad="12700" stA="38000" endPos="28000" dist="5000" dir="5400000" sy="-100000" algn="bl" rotWithShape="0"/>
+          </a:effectLst>
+        </p:spPr>
+      </p:pic>
     </p:spTree>
   </p:cSld>
   <p:clrMapOvr>
@@ -37146,15 +37056,7 @@
           <a:p>
             <a:r>
               <a:rPr lang="en-US" dirty="0" smtClean="0"/>
-              <a:t>.</a:t>
-            </a:r>
-            <a:r>
-              <a:rPr lang="en-US" dirty="0" smtClean="0"/>
-              <a:t>NET </a:t>
-            </a:r>
-            <a:r>
-              <a:rPr lang="en-US" dirty="0" smtClean="0"/>
-              <a:t>platform versions</a:t>
+              <a:t>.NET platform versions</a:t>
             </a:r>
           </a:p>
           <a:p>
@@ -37180,6 +37082,34 @@
           </a:p>
         </p:txBody>
       </p:sp>
+      <p:pic>
+        <p:nvPicPr>
+          <p:cNvPr id="100353" name="Picture 1" descr="C:\Trash\dotnet-logo.png"/>
+          <p:cNvPicPr>
+            <a:picLocks noChangeAspect="1" noChangeArrowheads="1"/>
+          </p:cNvPicPr>
+          <p:nvPr/>
+        </p:nvPicPr>
+        <p:blipFill>
+          <a:blip r:embed="rId3" cstate="print"/>
+          <a:srcRect/>
+          <a:stretch>
+            <a:fillRect/>
+          </a:stretch>
+        </p:blipFill>
+        <p:spPr bwMode="auto">
+          <a:xfrm>
+            <a:off x="6705600" y="4495800"/>
+            <a:ext cx="1847850" cy="1828800"/>
+          </a:xfrm>
+          <a:prstGeom prst="roundRect">
+            <a:avLst>
+              <a:gd name="adj" fmla="val 5129"/>
+            </a:avLst>
+          </a:prstGeom>
+          <a:noFill/>
+        </p:spPr>
+      </p:pic>
     </p:spTree>
   </p:cSld>
   <p:clrMapOvr>
@@ -37321,11 +37251,7 @@
             </a:r>
             <a:r>
               <a:rPr lang="en-US" dirty="0" smtClean="0"/>
-              <a:t>VB.NET</a:t>
-            </a:r>
-            <a:r>
-              <a:rPr lang="en-US" dirty="0" smtClean="0"/>
-              <a:t>,</a:t>
+              <a:t>VB.NET,</a:t>
             </a:r>
             <a:r>
               <a:rPr lang="bg-BG" dirty="0" smtClean="0"/>
@@ -37567,11 +37493,7 @@
             </a:pPr>
             <a:r>
               <a:rPr lang="en-US" dirty="0" smtClean="0"/>
-              <a:t>WCF / Silverlight </a:t>
-            </a:r>
-            <a:r>
-              <a:rPr lang="en-US" dirty="0" smtClean="0"/>
-              <a:t>Designer</a:t>
+              <a:t>WCF / Silverlight Designer</a:t>
             </a:r>
           </a:p>
           <a:p>
@@ -37609,11 +37531,7 @@
             </a:pPr>
             <a:r>
               <a:rPr lang="en-US" dirty="0" smtClean="0"/>
-              <a:t>Many third party </a:t>
-            </a:r>
-            <a:r>
-              <a:rPr lang="en-US" dirty="0" smtClean="0"/>
-              <a:t>extensions</a:t>
+              <a:t>Many third party extensions</a:t>
             </a:r>
             <a:endParaRPr lang="bg-BG" dirty="0"/>
           </a:p>
@@ -38582,29 +38500,8 @@
             </a:r>
             <a:r>
               <a:rPr lang="en-US" sz="2800" dirty="0" smtClean="0"/>
-              <a:t>is </a:t>
-            </a:r>
-            <a:r>
-              <a:rPr lang="en-US" sz="2800" dirty="0" smtClean="0"/>
-              <a:t>Common </a:t>
-            </a:r>
-            <a:r>
-              <a:rPr lang="en-US" sz="2800" dirty="0" smtClean="0"/>
-              <a:t>Language Runtime (CLR</a:t>
-            </a:r>
-            <a:r>
-              <a:rPr lang="en-US" sz="2800" dirty="0" smtClean="0"/>
-              <a:t>)</a:t>
-            </a:r>
-            <a:r>
-              <a:rPr lang="en-US" sz="2800" dirty="0" smtClean="0"/>
-              <a:t>? </a:t>
-            </a:r>
-            <a:r>
-              <a:rPr lang="en-US" sz="2800" dirty="0" smtClean="0"/>
-              <a:t>Why it is important part of .NET Framework?</a:t>
-            </a:r>
-            <a:endParaRPr lang="en-US" sz="2800" dirty="0" smtClean="0"/>
+              <a:t>is Common Language Runtime (CLR)? Why it is important part of .NET Framework?</a:t>
+            </a:r>
           </a:p>
           <a:p>
             <a:pPr marL="452438" indent="-452438">
@@ -39076,6 +38973,32 @@
           </a:p>
         </p:txBody>
       </p:sp>
+      <p:pic>
+        <p:nvPicPr>
+          <p:cNvPr id="98306" name="Picture 2" descr="http://gabrielrodriguez.net/wp-content/uploads/2009/01/microsoft-net-logo-white-300x192.png"/>
+          <p:cNvPicPr>
+            <a:picLocks noChangeAspect="1" noChangeArrowheads="1"/>
+          </p:cNvPicPr>
+          <p:nvPr/>
+        </p:nvPicPr>
+        <p:blipFill>
+          <a:blip r:embed="rId3" cstate="print"/>
+          <a:srcRect/>
+          <a:stretch>
+            <a:fillRect/>
+          </a:stretch>
+        </p:blipFill>
+        <p:spPr bwMode="auto">
+          <a:xfrm>
+            <a:off x="6857999" y="5334000"/>
+            <a:ext cx="1905001" cy="1219200"/>
+          </a:xfrm>
+          <a:prstGeom prst="rect">
+            <a:avLst/>
+          </a:prstGeom>
+          <a:noFill/>
+        </p:spPr>
+      </p:pic>
     </p:spTree>
   </p:cSld>
   <p:clrMapOvr>
@@ -39622,6 +39545,34 @@
           </a:p>
         </p:txBody>
       </p:sp>
+      <p:pic>
+        <p:nvPicPr>
+          <p:cNvPr id="94210" name="Picture 2" descr="http://www.teach-ict.com/ecdl/module_1/workbook7/miniweb/images/opsystem.jpg"/>
+          <p:cNvPicPr>
+            <a:picLocks noChangeAspect="1" noChangeArrowheads="1"/>
+          </p:cNvPicPr>
+          <p:nvPr/>
+        </p:nvPicPr>
+        <p:blipFill>
+          <a:blip r:embed="rId3" cstate="print"/>
+          <a:srcRect/>
+          <a:stretch>
+            <a:fillRect/>
+          </a:stretch>
+        </p:blipFill>
+        <p:spPr bwMode="auto">
+          <a:xfrm>
+            <a:off x="7543800" y="3962400"/>
+            <a:ext cx="1219200" cy="1243584"/>
+          </a:xfrm>
+          <a:prstGeom prst="roundRect">
+            <a:avLst>
+              <a:gd name="adj" fmla="val 5128"/>
+            </a:avLst>
+          </a:prstGeom>
+          <a:noFill/>
+        </p:spPr>
+      </p:pic>
     </p:spTree>
   </p:cSld>
   <p:clrMapOvr>
@@ -40435,6 +40386,123 @@
           </a:p>
         </p:txBody>
       </p:sp>
+      <p:sp>
+        <p:nvSpPr>
+          <p:cNvPr id="6" name="Cloud 5"/>
+          <p:cNvSpPr/>
+          <p:nvPr/>
+        </p:nvSpPr>
+        <p:spPr>
+          <a:xfrm>
+            <a:off x="6858000" y="3851731"/>
+            <a:ext cx="1752600" cy="796469"/>
+          </a:xfrm>
+          <a:prstGeom prst="cloud">
+            <a:avLst/>
+          </a:prstGeom>
+          <a:solidFill>
+            <a:schemeClr val="accent5">
+              <a:lumMod val="40000"/>
+              <a:lumOff val="60000"/>
+              <a:alpha val="15000"/>
+            </a:schemeClr>
+          </a:solidFill>
+          <a:ln w="12700">
+            <a:solidFill>
+              <a:schemeClr val="accent5">
+                <a:lumMod val="60000"/>
+                <a:lumOff val="40000"/>
+              </a:schemeClr>
+            </a:solidFill>
+          </a:ln>
+        </p:spPr>
+        <p:txBody>
+          <a:bodyPr wrap="square">
+            <a:spAutoFit/>
+          </a:bodyPr>
+          <a:lstStyle/>
+          <a:p>
+            <a:pPr algn="ctr" eaLnBrk="0" hangingPunct="0">
+              <a:spcBef>
+                <a:spcPts val="0"/>
+              </a:spcBef>
+              <a:buClr>
+                <a:schemeClr val="accent5">
+                  <a:lumMod val="40000"/>
+                  <a:lumOff val="60000"/>
+                </a:schemeClr>
+              </a:buClr>
+              <a:buSzPct val="70000"/>
+            </a:pPr>
+            <a:r>
+              <a:rPr lang="en-US" sz="2800" b="1" noProof="1" smtClean="0">
+                <a:solidFill>
+                  <a:srgbClr val="8CF4F2"/>
+                </a:solidFill>
+                <a:effectLst>
+                  <a:outerShdw blurRad="38100" dist="38100" dir="2700000" algn="tl">
+                    <a:srgbClr val="000000">
+                      <a:alpha val="43137"/>
+                    </a:srgbClr>
+                  </a:outerShdw>
+                </a:effectLst>
+                <a:latin typeface="Consolas" pitchFamily="49" charset="0"/>
+                <a:cs typeface="Consolas" pitchFamily="49" charset="0"/>
+              </a:rPr>
+              <a:t>CLR</a:t>
+            </a:r>
+            <a:endParaRPr lang="en-US" sz="2800" b="1" noProof="1">
+              <a:solidFill>
+                <a:srgbClr val="8CF4F2"/>
+              </a:solidFill>
+              <a:effectLst>
+                <a:outerShdw blurRad="38100" dist="38100" dir="2700000" algn="tl">
+                  <a:srgbClr val="000000">
+                    <a:alpha val="43137"/>
+                  </a:srgbClr>
+                </a:outerShdw>
+              </a:effectLst>
+              <a:latin typeface="Consolas" pitchFamily="49" charset="0"/>
+              <a:cs typeface="Consolas" pitchFamily="49" charset="0"/>
+            </a:endParaRPr>
+          </a:p>
+        </p:txBody>
+      </p:sp>
+      <p:pic>
+        <p:nvPicPr>
+          <p:cNvPr id="7" name="Picture 24" descr="BD18212_"/>
+          <p:cNvPicPr>
+            <a:picLocks noChangeAspect="1" noChangeArrowheads="1"/>
+          </p:cNvPicPr>
+          <p:nvPr/>
+        </p:nvPicPr>
+        <p:blipFill>
+          <a:blip r:embed="rId3" cstate="print">
+            <a:lum bright="10000" contrast="30000"/>
+          </a:blip>
+          <a:srcRect/>
+          <a:stretch>
+            <a:fillRect/>
+          </a:stretch>
+        </p:blipFill>
+        <p:spPr bwMode="auto">
+          <a:xfrm>
+            <a:off x="7924800" y="3581400"/>
+            <a:ext cx="820737" cy="698500"/>
+          </a:xfrm>
+          <a:prstGeom prst="rect">
+            <a:avLst/>
+          </a:prstGeom>
+          <a:noFill/>
+          <a:ln w="9525">
+            <a:noFill/>
+            <a:miter lim="800000"/>
+            <a:headEnd/>
+            <a:tailEnd/>
+          </a:ln>
+          <a:effectLst/>
+        </p:spPr>
+      </p:pic>
     </p:spTree>
   </p:cSld>
   <p:clrMapOvr>

</xml_diff>

<commit_message>
finished .NET Overview lecture
</commit_message>
<xml_diff>
--- a/lectures/1. .NET Framework Overview.pptx
+++ b/lectures/1. .NET Framework Overview.pptx
@@ -312,7 +312,7 @@
             <a:fld id="{3BF7C7B5-275F-4D1F-9AB4-9255447DBC73}" type="datetimeFigureOut">
               <a:rPr lang="en-US"/>
               <a:pPr/>
-              <a:t>2/15/2010</a:t>
+              <a:t>2/16/2010</a:t>
             </a:fld>
             <a:endParaRPr lang="en-US" dirty="0"/>
           </a:p>
@@ -538,7 +538,7 @@
             <a:fld id="{9B46F231-FB2B-4655-A644-E2477325E686}" type="datetimeFigureOut">
               <a:rPr lang="en-US"/>
               <a:pPr/>
-              <a:t>2/15/2010</a:t>
+              <a:t>2/16/2010</a:t>
             </a:fld>
             <a:endParaRPr lang="en-US" dirty="0"/>
           </a:p>
@@ -18706,10 +18706,20 @@
           </a:xfrm>
           <a:prstGeom prst="roundRect">
             <a:avLst>
-              <a:gd name="adj" fmla="val 8360"/>
+              <a:gd name="adj" fmla="val 8594"/>
             </a:avLst>
           </a:prstGeom>
-          <a:noFill/>
+          <a:solidFill>
+            <a:srgbClr val="FFFFFF">
+              <a:shade val="85000"/>
+            </a:srgbClr>
+          </a:solidFill>
+          <a:ln>
+            <a:noFill/>
+          </a:ln>
+          <a:effectLst>
+            <a:reflection blurRad="12700" stA="38000" endPos="28000" dist="5000" dir="5400000" sy="-100000" algn="bl" rotWithShape="0"/>
+          </a:effectLst>
         </p:spPr>
       </p:pic>
     </p:spTree>
@@ -19095,15 +19105,7 @@
             </a:r>
             <a:r>
               <a:rPr lang="en-US" dirty="0" smtClean="0"/>
-              <a:t>debug </a:t>
-            </a:r>
-            <a:r>
-              <a:rPr lang="en-US" dirty="0" smtClean="0"/>
-              <a:t>/					 </a:t>
-            </a:r>
-            <a:r>
-              <a:rPr lang="en-US" dirty="0" smtClean="0"/>
-              <a:t>profile of .NET code</a:t>
+              <a:t>debug /					 profile of .NET code</a:t>
             </a:r>
             <a:endParaRPr lang="bg-BG" dirty="0"/>
           </a:p>
@@ -20966,6 +20968,44 @@
           </a:p>
         </p:txBody>
       </p:sp>
+      <p:pic>
+        <p:nvPicPr>
+          <p:cNvPr id="64516" name="Picture 4" descr="http://ts1.mm.bing.net/images/thumbnail.aspx?q=1429249262756&amp;id=e174b74585b10dfd469acd27f24e4b35&amp;url=http%3a%2f%2fwww.pureelite.co.uk%2fwp-content%2fuploads%2f2009%2f03%2fbinary-code.jpg"/>
+          <p:cNvPicPr>
+            <a:picLocks noChangeAspect="1" noChangeArrowheads="1"/>
+          </p:cNvPicPr>
+          <p:nvPr/>
+        </p:nvPicPr>
+        <p:blipFill>
+          <a:blip r:embed="rId3" cstate="print"/>
+          <a:srcRect/>
+          <a:stretch>
+            <a:fillRect/>
+          </a:stretch>
+        </p:blipFill>
+        <p:spPr bwMode="auto">
+          <a:xfrm>
+            <a:off x="6324600" y="1104898"/>
+            <a:ext cx="2286000" cy="1714502"/>
+          </a:xfrm>
+          <a:prstGeom prst="roundRect">
+            <a:avLst>
+              <a:gd name="adj" fmla="val 8594"/>
+            </a:avLst>
+          </a:prstGeom>
+          <a:solidFill>
+            <a:srgbClr val="FFFFFF">
+              <a:shade val="85000"/>
+            </a:srgbClr>
+          </a:solidFill>
+          <a:ln>
+            <a:noFill/>
+          </a:ln>
+          <a:effectLst>
+            <a:reflection blurRad="12700" stA="38000" endPos="28000" dist="5000" dir="5400000" sy="-100000" algn="bl" rotWithShape="0"/>
+          </a:effectLst>
+        </p:spPr>
+      </p:pic>
     </p:spTree>
   </p:cSld>
   <p:clrMapOvr>
@@ -21673,6 +21713,37 @@
           </a:p>
         </p:txBody>
       </p:sp>
+      <p:pic>
+        <p:nvPicPr>
+          <p:cNvPr id="57346" name="Picture 2" descr="http://freethumbs.dreamstime.com/293/big/free_2931051.jpg"/>
+          <p:cNvPicPr>
+            <a:picLocks noChangeAspect="1" noChangeArrowheads="1"/>
+          </p:cNvPicPr>
+          <p:nvPr/>
+        </p:nvPicPr>
+        <p:blipFill>
+          <a:blip r:embed="rId3" cstate="print"/>
+          <a:srcRect/>
+          <a:stretch>
+            <a:fillRect/>
+          </a:stretch>
+        </p:blipFill>
+        <p:spPr bwMode="auto">
+          <a:xfrm>
+            <a:off x="6896100" y="3733800"/>
+            <a:ext cx="1790700" cy="1790700"/>
+          </a:xfrm>
+          <a:prstGeom prst="rect">
+            <a:avLst/>
+          </a:prstGeom>
+          <a:ln>
+            <a:noFill/>
+          </a:ln>
+          <a:effectLst>
+            <a:softEdge rad="112500"/>
+          </a:effectLst>
+        </p:spPr>
+      </p:pic>
     </p:spTree>
   </p:cSld>
   <p:clrMapOvr>
@@ -22181,6 +22252,41 @@
           </a:p>
         </p:txBody>
       </p:sp>
+      <p:pic>
+        <p:nvPicPr>
+          <p:cNvPr id="55298" name="Picture 2" descr="http://wardleyelectronics.com/i/leaded-assembly.jpg"/>
+          <p:cNvPicPr>
+            <a:picLocks noChangeAspect="1" noChangeArrowheads="1"/>
+          </p:cNvPicPr>
+          <p:nvPr/>
+        </p:nvPicPr>
+        <p:blipFill>
+          <a:blip r:embed="rId3" cstate="print"/>
+          <a:srcRect/>
+          <a:stretch>
+            <a:fillRect/>
+          </a:stretch>
+        </p:blipFill>
+        <p:spPr bwMode="auto">
+          <a:xfrm>
+            <a:off x="6678517" y="5067300"/>
+            <a:ext cx="2008283" cy="1333500"/>
+          </a:xfrm>
+          <a:prstGeom prst="roundRect">
+            <a:avLst>
+              <a:gd name="adj" fmla="val 9132"/>
+            </a:avLst>
+          </a:prstGeom>
+          <a:noFill/>
+          <a:ln w="3175">
+            <a:solidFill>
+              <a:srgbClr val="92D050">
+                <a:alpha val="25000"/>
+              </a:srgbClr>
+            </a:solidFill>
+          </a:ln>
+        </p:spPr>
+      </p:pic>
     </p:spTree>
   </p:cSld>
   <p:clrMapOvr>
@@ -27016,6 +27122,41 @@
           </a:p>
         </p:txBody>
       </p:sp>
+      <p:pic>
+        <p:nvPicPr>
+          <p:cNvPr id="45058" name="Picture 2" descr="http://www.jwz.org/xscreensaver/screenshots/abstractile.jpg"/>
+          <p:cNvPicPr>
+            <a:picLocks noChangeAspect="1" noChangeArrowheads="1"/>
+          </p:cNvPicPr>
+          <p:nvPr/>
+        </p:nvPicPr>
+        <p:blipFill>
+          <a:blip r:embed="rId3" cstate="print"/>
+          <a:srcRect/>
+          <a:stretch>
+            <a:fillRect/>
+          </a:stretch>
+        </p:blipFill>
+        <p:spPr bwMode="auto">
+          <a:xfrm>
+            <a:off x="1981200" y="4953000"/>
+            <a:ext cx="5181600" cy="1393902"/>
+          </a:xfrm>
+          <a:prstGeom prst="roundRect">
+            <a:avLst>
+              <a:gd name="adj" fmla="val 6821"/>
+            </a:avLst>
+          </a:prstGeom>
+          <a:noFill/>
+          <a:ln>
+            <a:solidFill>
+              <a:srgbClr val="FFFF00">
+                <a:alpha val="25000"/>
+              </a:srgbClr>
+            </a:solidFill>
+          </a:ln>
+        </p:spPr>
+      </p:pic>
     </p:spTree>
   </p:cSld>
   <p:clrMapOvr>
@@ -28531,16 +28672,12 @@
             </a:pPr>
             <a:r>
               <a:rPr lang="en-US" dirty="0"/>
-              <a:t>Virtual Execution System (VES)</a:t>
-            </a:r>
-            <a:endParaRPr lang="bg-BG" dirty="0"/>
-          </a:p>
-          <a:p>
-            <a:pPr lvl="1">
-              <a:spcBef>
-                <a:spcPct val="35000"/>
-              </a:spcBef>
-            </a:pPr>
+              <a:t>Virtual Execution System (VES</a:t>
+            </a:r>
+            <a:r>
+              <a:rPr lang="en-US" dirty="0" smtClean="0"/>
+              <a:t>)</a:t>
+            </a:r>
             <a:endParaRPr lang="en-US" dirty="0"/>
           </a:p>
           <a:p>
@@ -28553,6 +28690,34 @@
           </a:p>
         </p:txBody>
       </p:sp>
+      <p:pic>
+        <p:nvPicPr>
+          <p:cNvPr id="34818" name="Picture 2" descr="http://cn.thebigword.com/admin/editoruploads/image/TechnicalSpecification.jpg"/>
+          <p:cNvPicPr>
+            <a:picLocks noChangeAspect="1" noChangeArrowheads="1"/>
+          </p:cNvPicPr>
+          <p:nvPr/>
+        </p:nvPicPr>
+        <p:blipFill>
+          <a:blip r:embed="rId3" cstate="print"/>
+          <a:srcRect/>
+          <a:stretch>
+            <a:fillRect/>
+          </a:stretch>
+        </p:blipFill>
+        <p:spPr bwMode="auto">
+          <a:xfrm>
+            <a:off x="6858000" y="4648200"/>
+            <a:ext cx="1724025" cy="1724025"/>
+          </a:xfrm>
+          <a:prstGeom prst="roundRect">
+            <a:avLst>
+              <a:gd name="adj" fmla="val 6758"/>
+            </a:avLst>
+          </a:prstGeom>
+          <a:noFill/>
+        </p:spPr>
+      </p:pic>
     </p:spTree>
   </p:cSld>
   <p:clrMapOvr>
@@ -30532,6 +30697,32 @@
           </a:p>
         </p:txBody>
       </p:sp>
+      <p:pic>
+        <p:nvPicPr>
+          <p:cNvPr id="21506" name="Picture 2" descr="http://skysigal.xact-solutions.com/Portals/SkySigal/images/Blog/WLW/CStandardDateTimestringFormattingcodes_1320/blog_csharp_globalization_2.png"/>
+          <p:cNvPicPr>
+            <a:picLocks noChangeAspect="1" noChangeArrowheads="1"/>
+          </p:cNvPicPr>
+          <p:nvPr/>
+        </p:nvPicPr>
+        <p:blipFill>
+          <a:blip r:embed="rId3" cstate="print"/>
+          <a:srcRect/>
+          <a:stretch>
+            <a:fillRect/>
+          </a:stretch>
+        </p:blipFill>
+        <p:spPr bwMode="auto">
+          <a:xfrm>
+            <a:off x="7239000" y="2362200"/>
+            <a:ext cx="1447800" cy="1447800"/>
+          </a:xfrm>
+          <a:prstGeom prst="ellipse">
+            <a:avLst/>
+          </a:prstGeom>
+          <a:noFill/>
+        </p:spPr>
+      </p:pic>
     </p:spTree>
   </p:cSld>
   <p:clrMapOvr>
@@ -37349,6 +37540,34 @@
           </a:p>
         </p:txBody>
       </p:sp>
+      <p:pic>
+        <p:nvPicPr>
+          <p:cNvPr id="11265" name="Picture 1" descr="C:\Trash\vs2010-logo-small.png"/>
+          <p:cNvPicPr>
+            <a:picLocks noChangeAspect="1" noChangeArrowheads="1"/>
+          </p:cNvPicPr>
+          <p:nvPr/>
+        </p:nvPicPr>
+        <p:blipFill>
+          <a:blip r:embed="rId2" cstate="print"/>
+          <a:srcRect/>
+          <a:stretch>
+            <a:fillRect/>
+          </a:stretch>
+        </p:blipFill>
+        <p:spPr bwMode="auto">
+          <a:xfrm>
+            <a:off x="7162800" y="4191000"/>
+            <a:ext cx="1428750" cy="609600"/>
+          </a:xfrm>
+          <a:prstGeom prst="roundRect">
+            <a:avLst>
+              <a:gd name="adj" fmla="val 11722"/>
+            </a:avLst>
+          </a:prstGeom>
+          <a:noFill/>
+        </p:spPr>
+      </p:pic>
     </p:spTree>
   </p:cSld>
   <p:clrMapOvr>
@@ -37537,6 +37756,34 @@
           </a:p>
         </p:txBody>
       </p:sp>
+      <p:pic>
+        <p:nvPicPr>
+          <p:cNvPr id="4" name="Picture 1" descr="C:\Trash\vs2010-logo-small.png"/>
+          <p:cNvPicPr>
+            <a:picLocks noChangeAspect="1" noChangeArrowheads="1"/>
+          </p:cNvPicPr>
+          <p:nvPr/>
+        </p:nvPicPr>
+        <p:blipFill>
+          <a:blip r:embed="rId3" cstate="print"/>
+          <a:srcRect/>
+          <a:stretch>
+            <a:fillRect/>
+          </a:stretch>
+        </p:blipFill>
+        <p:spPr bwMode="auto">
+          <a:xfrm>
+            <a:off x="7239000" y="1219200"/>
+            <a:ext cx="1428750" cy="609600"/>
+          </a:xfrm>
+          <a:prstGeom prst="roundRect">
+            <a:avLst>
+              <a:gd name="adj" fmla="val 11722"/>
+            </a:avLst>
+          </a:prstGeom>
+          <a:noFill/>
+        </p:spPr>
+      </p:pic>
     </p:spTree>
   </p:cSld>
   <p:clrMapOvr>

</xml_diff>